<commit_message>
Updated linear regression example
</commit_message>
<xml_diff>
--- a/supplemental_topics/regression/Logisitic_Regression_Breast_Cancer.pptx
+++ b/supplemental_topics/regression/Logisitic_Regression_Breast_Cancer.pptx
@@ -5,7 +5,7 @@
     <p:sldMasterId id="2147483648" r:id="rId1"/>
   </p:sldMasterIdLst>
   <p:notesMasterIdLst>
-    <p:notesMasterId r:id="rId12"/>
+    <p:notesMasterId r:id="rId15"/>
   </p:notesMasterIdLst>
   <p:sldIdLst>
     <p:sldId id="257" r:id="rId2"/>
@@ -18,6 +18,9 @@
     <p:sldId id="265" r:id="rId9"/>
     <p:sldId id="266" r:id="rId10"/>
     <p:sldId id="267" r:id="rId11"/>
+    <p:sldId id="268" r:id="rId12"/>
+    <p:sldId id="269" r:id="rId13"/>
+    <p:sldId id="270" r:id="rId14"/>
   </p:sldIdLst>
   <p:sldSz cx="12192000" cy="6858000"/>
   <p:notesSz cx="6858000" cy="9144000"/>
@@ -116,6 +119,11 @@
       </a:defRPr>
     </a:lvl9pPr>
   </p:defaultTextStyle>
+  <p:extLst>
+    <p:ext uri="{EFAFB233-063F-42B5-8137-9DF3F51BA10A}">
+      <p15:sldGuideLst xmlns:p15="http://schemas.microsoft.com/office/powerpoint/2012/main"/>
+    </p:ext>
+  </p:extLst>
 </p:presentation>
 </file>
 
@@ -201,7 +209,7 @@
           <a:p>
             <a:fld id="{474AF6C9-3997-F24B-B6EB-82169BF27B63}" type="datetimeFigureOut">
               <a:rPr lang="en-US" smtClean="0"/>
-              <a:t>9/8/22</a:t>
+              <a:t>9/22/22</a:t>
             </a:fld>
             <a:endParaRPr lang="en-US"/>
           </a:p>
@@ -699,7 +707,7 @@
           <a:p>
             <a:fld id="{4449C7F0-F2FB-044F-A543-063DC7859EB7}" type="datetimeFigureOut">
               <a:rPr lang="en-US" smtClean="0"/>
-              <a:t>9/8/22</a:t>
+              <a:t>9/22/22</a:t>
             </a:fld>
             <a:endParaRPr lang="en-US"/>
           </a:p>
@@ -897,7 +905,7 @@
           <a:p>
             <a:fld id="{4449C7F0-F2FB-044F-A543-063DC7859EB7}" type="datetimeFigureOut">
               <a:rPr lang="en-US" smtClean="0"/>
-              <a:t>9/8/22</a:t>
+              <a:t>9/22/22</a:t>
             </a:fld>
             <a:endParaRPr lang="en-US"/>
           </a:p>
@@ -1105,7 +1113,7 @@
           <a:p>
             <a:fld id="{4449C7F0-F2FB-044F-A543-063DC7859EB7}" type="datetimeFigureOut">
               <a:rPr lang="en-US" smtClean="0"/>
-              <a:t>9/8/22</a:t>
+              <a:t>9/22/22</a:t>
             </a:fld>
             <a:endParaRPr lang="en-US"/>
           </a:p>
@@ -1303,7 +1311,7 @@
           <a:p>
             <a:fld id="{4449C7F0-F2FB-044F-A543-063DC7859EB7}" type="datetimeFigureOut">
               <a:rPr lang="en-US" smtClean="0"/>
-              <a:t>9/8/22</a:t>
+              <a:t>9/22/22</a:t>
             </a:fld>
             <a:endParaRPr lang="en-US"/>
           </a:p>
@@ -1578,7 +1586,7 @@
           <a:p>
             <a:fld id="{4449C7F0-F2FB-044F-A543-063DC7859EB7}" type="datetimeFigureOut">
               <a:rPr lang="en-US" smtClean="0"/>
-              <a:t>9/8/22</a:t>
+              <a:t>9/22/22</a:t>
             </a:fld>
             <a:endParaRPr lang="en-US"/>
           </a:p>
@@ -1843,7 +1851,7 @@
           <a:p>
             <a:fld id="{4449C7F0-F2FB-044F-A543-063DC7859EB7}" type="datetimeFigureOut">
               <a:rPr lang="en-US" smtClean="0"/>
-              <a:t>9/8/22</a:t>
+              <a:t>9/22/22</a:t>
             </a:fld>
             <a:endParaRPr lang="en-US"/>
           </a:p>
@@ -2255,7 +2263,7 @@
           <a:p>
             <a:fld id="{4449C7F0-F2FB-044F-A543-063DC7859EB7}" type="datetimeFigureOut">
               <a:rPr lang="en-US" smtClean="0"/>
-              <a:t>9/8/22</a:t>
+              <a:t>9/22/22</a:t>
             </a:fld>
             <a:endParaRPr lang="en-US"/>
           </a:p>
@@ -2396,7 +2404,7 @@
           <a:p>
             <a:fld id="{4449C7F0-F2FB-044F-A543-063DC7859EB7}" type="datetimeFigureOut">
               <a:rPr lang="en-US" smtClean="0"/>
-              <a:t>9/8/22</a:t>
+              <a:t>9/22/22</a:t>
             </a:fld>
             <a:endParaRPr lang="en-US"/>
           </a:p>
@@ -2509,7 +2517,7 @@
           <a:p>
             <a:fld id="{4449C7F0-F2FB-044F-A543-063DC7859EB7}" type="datetimeFigureOut">
               <a:rPr lang="en-US" smtClean="0"/>
-              <a:t>9/8/22</a:t>
+              <a:t>9/22/22</a:t>
             </a:fld>
             <a:endParaRPr lang="en-US"/>
           </a:p>
@@ -2820,7 +2828,7 @@
           <a:p>
             <a:fld id="{4449C7F0-F2FB-044F-A543-063DC7859EB7}" type="datetimeFigureOut">
               <a:rPr lang="en-US" smtClean="0"/>
-              <a:t>9/8/22</a:t>
+              <a:t>9/22/22</a:t>
             </a:fld>
             <a:endParaRPr lang="en-US"/>
           </a:p>
@@ -3108,7 +3116,7 @@
           <a:p>
             <a:fld id="{4449C7F0-F2FB-044F-A543-063DC7859EB7}" type="datetimeFigureOut">
               <a:rPr lang="en-US" smtClean="0"/>
-              <a:t>9/8/22</a:t>
+              <a:t>9/22/22</a:t>
             </a:fld>
             <a:endParaRPr lang="en-US"/>
           </a:p>
@@ -3349,7 +3357,7 @@
           <a:p>
             <a:fld id="{4449C7F0-F2FB-044F-A543-063DC7859EB7}" type="datetimeFigureOut">
               <a:rPr lang="en-US" smtClean="0"/>
-              <a:t>9/8/22</a:t>
+              <a:t>9/22/22</a:t>
             </a:fld>
             <a:endParaRPr lang="en-US"/>
           </a:p>
@@ -4086,6 +4094,427 @@
 </p:sld>
 </file>
 
+<file path=ppt/slides/slide11.xml><?xml version="1.0" encoding="utf-8"?>
+<p:sld xmlns:a="http://schemas.openxmlformats.org/drawingml/2006/main" xmlns:r="http://schemas.openxmlformats.org/officeDocument/2006/relationships" xmlns:p="http://schemas.openxmlformats.org/presentationml/2006/main">
+  <p:cSld>
+    <p:spTree>
+      <p:nvGrpSpPr>
+        <p:cNvPr id="1" name=""/>
+        <p:cNvGrpSpPr/>
+        <p:nvPr/>
+      </p:nvGrpSpPr>
+      <p:grpSpPr>
+        <a:xfrm>
+          <a:off x="0" y="0"/>
+          <a:ext cx="0" cy="0"/>
+          <a:chOff x="0" y="0"/>
+          <a:chExt cx="0" cy="0"/>
+        </a:xfrm>
+      </p:grpSpPr>
+      <p:sp>
+        <p:nvSpPr>
+          <p:cNvPr id="2" name="Title 1">
+            <a:extLst>
+              <a:ext uri="{FF2B5EF4-FFF2-40B4-BE49-F238E27FC236}">
+                <a16:creationId xmlns:a16="http://schemas.microsoft.com/office/drawing/2014/main" id="{507306C8-5507-4A5F-8172-67E5E00584FF}"/>
+              </a:ext>
+            </a:extLst>
+          </p:cNvPr>
+          <p:cNvSpPr>
+            <a:spLocks noGrp="1"/>
+          </p:cNvSpPr>
+          <p:nvPr>
+            <p:ph type="title"/>
+          </p:nvPr>
+        </p:nvSpPr>
+        <p:spPr/>
+        <p:txBody>
+          <a:bodyPr/>
+          <a:lstStyle/>
+          <a:p>
+            <a:r>
+              <a:rPr lang="en-US" dirty="0"/>
+              <a:t>Convert probabilities to classes</a:t>
+            </a:r>
+          </a:p>
+        </p:txBody>
+      </p:sp>
+      <p:sp>
+        <p:nvSpPr>
+          <p:cNvPr id="3" name="Content Placeholder 2">
+            <a:extLst>
+              <a:ext uri="{FF2B5EF4-FFF2-40B4-BE49-F238E27FC236}">
+                <a16:creationId xmlns:a16="http://schemas.microsoft.com/office/drawing/2014/main" id="{224FADF4-6153-D05B-623C-5C4EDB5FE416}"/>
+              </a:ext>
+            </a:extLst>
+          </p:cNvPr>
+          <p:cNvSpPr>
+            <a:spLocks noGrp="1"/>
+          </p:cNvSpPr>
+          <p:nvPr>
+            <p:ph idx="1"/>
+          </p:nvPr>
+        </p:nvSpPr>
+        <p:spPr/>
+        <p:txBody>
+          <a:bodyPr/>
+          <a:lstStyle/>
+          <a:p>
+            <a:r>
+              <a:rPr lang="en-US" dirty="0" err="1"/>
+              <a:t>y_pred_class</a:t>
+            </a:r>
+            <a:r>
+              <a:rPr lang="en-US" dirty="0"/>
+              <a:t> = </a:t>
+            </a:r>
+            <a:r>
+              <a:rPr lang="en-US" dirty="0" err="1"/>
+              <a:t>ifelse</a:t>
+            </a:r>
+            <a:r>
+              <a:rPr lang="en-US" dirty="0"/>
+              <a:t>(pred &gt; .5, 1, 0)</a:t>
+            </a:r>
+          </a:p>
+          <a:p>
+            <a:r>
+              <a:rPr lang="en-US" dirty="0" err="1"/>
+              <a:t>y_pred_factor</a:t>
+            </a:r>
+            <a:r>
+              <a:rPr lang="en-US" dirty="0"/>
+              <a:t> = factor(</a:t>
+            </a:r>
+            <a:r>
+              <a:rPr lang="en-US" dirty="0" err="1"/>
+              <a:t>y_pred_class</a:t>
+            </a:r>
+            <a:r>
+              <a:rPr lang="en-US" dirty="0"/>
+              <a:t>, levels=c(0,1))</a:t>
+            </a:r>
+          </a:p>
+          <a:p>
+            <a:r>
+              <a:rPr lang="en-US" dirty="0" err="1"/>
+              <a:t>testData$preds</a:t>
+            </a:r>
+            <a:r>
+              <a:rPr lang="en-US" dirty="0"/>
+              <a:t> = </a:t>
+            </a:r>
+            <a:r>
+              <a:rPr lang="en-US" dirty="0" err="1"/>
+              <a:t>y_pred_factor</a:t>
+            </a:r>
+            <a:endParaRPr lang="en-US" dirty="0"/>
+          </a:p>
+        </p:txBody>
+      </p:sp>
+    </p:spTree>
+    <p:extLst>
+      <p:ext uri="{BB962C8B-B14F-4D97-AF65-F5344CB8AC3E}">
+        <p14:creationId xmlns:p14="http://schemas.microsoft.com/office/powerpoint/2010/main" val="3073837789"/>
+      </p:ext>
+    </p:extLst>
+  </p:cSld>
+  <p:clrMapOvr>
+    <a:masterClrMapping/>
+  </p:clrMapOvr>
+</p:sld>
+</file>
+
+<file path=ppt/slides/slide12.xml><?xml version="1.0" encoding="utf-8"?>
+<p:sld xmlns:a="http://schemas.openxmlformats.org/drawingml/2006/main" xmlns:r="http://schemas.openxmlformats.org/officeDocument/2006/relationships" xmlns:p="http://schemas.openxmlformats.org/presentationml/2006/main">
+  <p:cSld>
+    <p:spTree>
+      <p:nvGrpSpPr>
+        <p:cNvPr id="1" name=""/>
+        <p:cNvGrpSpPr/>
+        <p:nvPr/>
+      </p:nvGrpSpPr>
+      <p:grpSpPr>
+        <a:xfrm>
+          <a:off x="0" y="0"/>
+          <a:ext cx="0" cy="0"/>
+          <a:chOff x="0" y="0"/>
+          <a:chExt cx="0" cy="0"/>
+        </a:xfrm>
+      </p:grpSpPr>
+      <p:sp>
+        <p:nvSpPr>
+          <p:cNvPr id="4" name="Title 3">
+            <a:extLst>
+              <a:ext uri="{FF2B5EF4-FFF2-40B4-BE49-F238E27FC236}">
+                <a16:creationId xmlns:a16="http://schemas.microsoft.com/office/drawing/2014/main" id="{318C25F6-B357-1BAA-EF3D-18E07D2DA588}"/>
+              </a:ext>
+            </a:extLst>
+          </p:cNvPr>
+          <p:cNvSpPr>
+            <a:spLocks noGrp="1"/>
+          </p:cNvSpPr>
+          <p:nvPr>
+            <p:ph type="title"/>
+          </p:nvPr>
+        </p:nvSpPr>
+        <p:spPr/>
+        <p:txBody>
+          <a:bodyPr>
+            <a:normAutofit/>
+          </a:bodyPr>
+          <a:lstStyle/>
+          <a:p>
+            <a:r>
+              <a:rPr lang="en-US" sz="1800" dirty="0" err="1"/>
+              <a:t>confusionMatrix</a:t>
+            </a:r>
+            <a:r>
+              <a:rPr lang="en-US" sz="1800" dirty="0"/>
+              <a:t>(</a:t>
+            </a:r>
+            <a:r>
+              <a:rPr lang="en-US" sz="1800" dirty="0" err="1"/>
+              <a:t>testData$Class</a:t>
+            </a:r>
+            <a:r>
+              <a:rPr lang="en-US" sz="1800" dirty="0"/>
+              <a:t>, </a:t>
+            </a:r>
+            <a:r>
+              <a:rPr lang="en-US" sz="1800" dirty="0" err="1"/>
+              <a:t>y_pred_factor</a:t>
+            </a:r>
+            <a:r>
+              <a:rPr lang="en-US" sz="1800" dirty="0"/>
+              <a:t>)</a:t>
+            </a:r>
+          </a:p>
+        </p:txBody>
+      </p:sp>
+      <p:sp>
+        <p:nvSpPr>
+          <p:cNvPr id="6" name="Text Placeholder 5">
+            <a:extLst>
+              <a:ext uri="{FF2B5EF4-FFF2-40B4-BE49-F238E27FC236}">
+                <a16:creationId xmlns:a16="http://schemas.microsoft.com/office/drawing/2014/main" id="{CDF17EEE-2D2F-F55F-DA2F-20D5979A690A}"/>
+              </a:ext>
+            </a:extLst>
+          </p:cNvPr>
+          <p:cNvSpPr>
+            <a:spLocks noGrp="1"/>
+          </p:cNvSpPr>
+          <p:nvPr>
+            <p:ph type="body" sz="half" idx="2"/>
+          </p:nvPr>
+        </p:nvSpPr>
+        <p:spPr/>
+        <p:txBody>
+          <a:bodyPr/>
+          <a:lstStyle/>
+          <a:p>
+            <a:pPr marL="285750" indent="-285750">
+              <a:buFont typeface="Arial" panose="020B0604020202020204" pitchFamily="34" charset="0"/>
+              <a:buChar char="•"/>
+            </a:pPr>
+            <a:r>
+              <a:rPr lang="en-US" dirty="0"/>
+              <a:t>Confusion matrix at top</a:t>
+            </a:r>
+          </a:p>
+          <a:p>
+            <a:pPr marL="285750" indent="-285750">
+              <a:buFont typeface="Arial" panose="020B0604020202020204" pitchFamily="34" charset="0"/>
+              <a:buChar char="•"/>
+            </a:pPr>
+            <a:r>
+              <a:rPr lang="en-US" dirty="0"/>
+              <a:t>Followed by test metrics</a:t>
+            </a:r>
+          </a:p>
+          <a:p>
+            <a:pPr marL="742950" lvl="1" indent="-285750">
+              <a:buFont typeface="Arial" panose="020B0604020202020204" pitchFamily="34" charset="0"/>
+              <a:buChar char="•"/>
+            </a:pPr>
+            <a:r>
+              <a:rPr lang="en-US" dirty="0"/>
+              <a:t>Key metrics</a:t>
+            </a:r>
+          </a:p>
+          <a:p>
+            <a:pPr marL="1200150" lvl="2" indent="-285750">
+              <a:buFont typeface="Arial" panose="020B0604020202020204" pitchFamily="34" charset="0"/>
+              <a:buChar char="•"/>
+            </a:pPr>
+            <a:r>
+              <a:rPr lang="en-US" dirty="0"/>
+              <a:t>Accuracy</a:t>
+            </a:r>
+          </a:p>
+          <a:p>
+            <a:pPr marL="1200150" lvl="2" indent="-285750">
+              <a:buFont typeface="Arial" panose="020B0604020202020204" pitchFamily="34" charset="0"/>
+              <a:buChar char="•"/>
+            </a:pPr>
+            <a:r>
+              <a:rPr lang="en-US" dirty="0"/>
+              <a:t>Sensitivity</a:t>
+            </a:r>
+          </a:p>
+          <a:p>
+            <a:pPr marL="1200150" lvl="2" indent="-285750">
+              <a:buFont typeface="Arial" panose="020B0604020202020204" pitchFamily="34" charset="0"/>
+              <a:buChar char="•"/>
+            </a:pPr>
+            <a:r>
+              <a:rPr lang="en-US" dirty="0"/>
+              <a:t>Specificity </a:t>
+            </a:r>
+          </a:p>
+          <a:p>
+            <a:pPr marL="285750" indent="-285750">
+              <a:buFont typeface="Arial" panose="020B0604020202020204" pitchFamily="34" charset="0"/>
+              <a:buChar char="•"/>
+            </a:pPr>
+            <a:r>
+              <a:rPr lang="en-US" dirty="0"/>
+              <a:t>Positive class helps you interpret the metrics</a:t>
+            </a:r>
+          </a:p>
+        </p:txBody>
+      </p:sp>
+      <p:pic>
+        <p:nvPicPr>
+          <p:cNvPr id="14" name="Picture 13" descr="Text&#10;&#10;Description automatically generated">
+            <a:extLst>
+              <a:ext uri="{FF2B5EF4-FFF2-40B4-BE49-F238E27FC236}">
+                <a16:creationId xmlns:a16="http://schemas.microsoft.com/office/drawing/2014/main" id="{DDAC1F22-A7B9-8A28-FF38-F569EC2F80D3}"/>
+              </a:ext>
+            </a:extLst>
+          </p:cNvPr>
+          <p:cNvPicPr>
+            <a:picLocks noChangeAspect="1"/>
+          </p:cNvPicPr>
+          <p:nvPr/>
+        </p:nvPicPr>
+        <p:blipFill>
+          <a:blip r:embed="rId2"/>
+          <a:stretch>
+            <a:fillRect/>
+          </a:stretch>
+        </p:blipFill>
+        <p:spPr>
+          <a:xfrm>
+            <a:off x="6302707" y="0"/>
+            <a:ext cx="4677570" cy="6858000"/>
+          </a:xfrm>
+          <a:prstGeom prst="rect">
+            <a:avLst/>
+          </a:prstGeom>
+        </p:spPr>
+      </p:pic>
+    </p:spTree>
+    <p:extLst>
+      <p:ext uri="{BB962C8B-B14F-4D97-AF65-F5344CB8AC3E}">
+        <p14:creationId xmlns:p14="http://schemas.microsoft.com/office/powerpoint/2010/main" val="1971816574"/>
+      </p:ext>
+    </p:extLst>
+  </p:cSld>
+  <p:clrMapOvr>
+    <a:masterClrMapping/>
+  </p:clrMapOvr>
+</p:sld>
+</file>
+
+<file path=ppt/slides/slide13.xml><?xml version="1.0" encoding="utf-8"?>
+<p:sld xmlns:a="http://schemas.openxmlformats.org/drawingml/2006/main" xmlns:r="http://schemas.openxmlformats.org/officeDocument/2006/relationships" xmlns:p="http://schemas.openxmlformats.org/presentationml/2006/main">
+  <p:cSld>
+    <p:spTree>
+      <p:nvGrpSpPr>
+        <p:cNvPr id="1" name=""/>
+        <p:cNvGrpSpPr/>
+        <p:nvPr/>
+      </p:nvGrpSpPr>
+      <p:grpSpPr>
+        <a:xfrm>
+          <a:off x="0" y="0"/>
+          <a:ext cx="0" cy="0"/>
+          <a:chOff x="0" y="0"/>
+          <a:chExt cx="0" cy="0"/>
+        </a:xfrm>
+      </p:grpSpPr>
+      <p:sp>
+        <p:nvSpPr>
+          <p:cNvPr id="2" name="Title 1">
+            <a:extLst>
+              <a:ext uri="{FF2B5EF4-FFF2-40B4-BE49-F238E27FC236}">
+                <a16:creationId xmlns:a16="http://schemas.microsoft.com/office/drawing/2014/main" id="{1FB695AD-BEF4-6BC8-0360-A8F39D53B791}"/>
+              </a:ext>
+            </a:extLst>
+          </p:cNvPr>
+          <p:cNvSpPr>
+            <a:spLocks noGrp="1"/>
+          </p:cNvSpPr>
+          <p:nvPr>
+            <p:ph type="title"/>
+          </p:nvPr>
+        </p:nvSpPr>
+        <p:spPr/>
+        <p:txBody>
+          <a:bodyPr/>
+          <a:lstStyle/>
+          <a:p>
+            <a:r>
+              <a:rPr lang="en-US" dirty="0"/>
+              <a:t>Visualize Confusion Matrix</a:t>
+            </a:r>
+          </a:p>
+        </p:txBody>
+      </p:sp>
+      <p:pic>
+        <p:nvPicPr>
+          <p:cNvPr id="6" name="Picture 5" descr="Chart, treemap chart&#10;&#10;Description automatically generated">
+            <a:extLst>
+              <a:ext uri="{FF2B5EF4-FFF2-40B4-BE49-F238E27FC236}">
+                <a16:creationId xmlns:a16="http://schemas.microsoft.com/office/drawing/2014/main" id="{A1E422A6-F928-DD4E-3026-26C5C9E0BA9E}"/>
+              </a:ext>
+            </a:extLst>
+          </p:cNvPr>
+          <p:cNvPicPr>
+            <a:picLocks noChangeAspect="1"/>
+          </p:cNvPicPr>
+          <p:nvPr/>
+        </p:nvPicPr>
+        <p:blipFill>
+          <a:blip r:embed="rId2"/>
+          <a:stretch>
+            <a:fillRect/>
+          </a:stretch>
+        </p:blipFill>
+        <p:spPr>
+          <a:xfrm>
+            <a:off x="1713941" y="1388908"/>
+            <a:ext cx="8270317" cy="5103967"/>
+          </a:xfrm>
+          <a:prstGeom prst="rect">
+            <a:avLst/>
+          </a:prstGeom>
+        </p:spPr>
+      </p:pic>
+    </p:spTree>
+    <p:extLst>
+      <p:ext uri="{BB962C8B-B14F-4D97-AF65-F5344CB8AC3E}">
+        <p14:creationId xmlns:p14="http://schemas.microsoft.com/office/powerpoint/2010/main" val="1574399684"/>
+      </p:ext>
+    </p:extLst>
+  </p:cSld>
+  <p:clrMapOvr>
+    <a:masterClrMapping/>
+  </p:clrMapOvr>
+</p:sld>
+</file>
+
 <file path=ppt/slides/slide2.xml><?xml version="1.0" encoding="utf-8"?>
 <p:sld xmlns:a="http://schemas.openxmlformats.org/drawingml/2006/main" xmlns:r="http://schemas.openxmlformats.org/officeDocument/2006/relationships" xmlns:p="http://schemas.openxmlformats.org/presentationml/2006/main">
   <p:cSld>
@@ -4990,7 +5419,7 @@
           <a:p>
             <a:r>
               <a:rPr lang="en-US" dirty="0"/>
-              <a:t>Family is binomial because it is a two class classification</a:t>
+              <a:t>Family is binomial because it is a two-class classification</a:t>
             </a:r>
           </a:p>
           <a:p>

</xml_diff>